<commit_message>
Added page on pptx
</commit_message>
<xml_diff>
--- a/SharedDomain/RabbitMQProgetto.pptx
+++ b/SharedDomain/RabbitMQProgetto.pptx
@@ -15,6 +15,7 @@
     <p:sldId id="266" r:id="rId9"/>
     <p:sldId id="263" r:id="rId10"/>
     <p:sldId id="264" r:id="rId11"/>
+    <p:sldId id="267" r:id="rId12"/>
   </p:sldIdLst>
   <p:sldSz cx="12192000" cy="6858000"/>
   <p:notesSz cx="6858000" cy="9144000"/>
@@ -268,7 +269,7 @@
           <a:p>
             <a:fld id="{627A7FD4-D23E-4EE1-9D5D-C5330F442824}" type="datetimeFigureOut">
               <a:rPr lang="it-IT" smtClean="0"/>
-              <a:t>06/02/2024</a:t>
+              <a:t>07/02/2024</a:t>
             </a:fld>
             <a:endParaRPr lang="it-IT"/>
           </a:p>
@@ -466,7 +467,7 @@
           <a:p>
             <a:fld id="{627A7FD4-D23E-4EE1-9D5D-C5330F442824}" type="datetimeFigureOut">
               <a:rPr lang="it-IT" smtClean="0"/>
-              <a:t>06/02/2024</a:t>
+              <a:t>07/02/2024</a:t>
             </a:fld>
             <a:endParaRPr lang="it-IT"/>
           </a:p>
@@ -674,7 +675,7 @@
           <a:p>
             <a:fld id="{627A7FD4-D23E-4EE1-9D5D-C5330F442824}" type="datetimeFigureOut">
               <a:rPr lang="it-IT" smtClean="0"/>
-              <a:t>06/02/2024</a:t>
+              <a:t>07/02/2024</a:t>
             </a:fld>
             <a:endParaRPr lang="it-IT"/>
           </a:p>
@@ -872,7 +873,7 @@
           <a:p>
             <a:fld id="{627A7FD4-D23E-4EE1-9D5D-C5330F442824}" type="datetimeFigureOut">
               <a:rPr lang="it-IT" smtClean="0"/>
-              <a:t>06/02/2024</a:t>
+              <a:t>07/02/2024</a:t>
             </a:fld>
             <a:endParaRPr lang="it-IT"/>
           </a:p>
@@ -1147,7 +1148,7 @@
           <a:p>
             <a:fld id="{627A7FD4-D23E-4EE1-9D5D-C5330F442824}" type="datetimeFigureOut">
               <a:rPr lang="it-IT" smtClean="0"/>
-              <a:t>06/02/2024</a:t>
+              <a:t>07/02/2024</a:t>
             </a:fld>
             <a:endParaRPr lang="it-IT"/>
           </a:p>
@@ -1412,7 +1413,7 @@
           <a:p>
             <a:fld id="{627A7FD4-D23E-4EE1-9D5D-C5330F442824}" type="datetimeFigureOut">
               <a:rPr lang="it-IT" smtClean="0"/>
-              <a:t>06/02/2024</a:t>
+              <a:t>07/02/2024</a:t>
             </a:fld>
             <a:endParaRPr lang="it-IT"/>
           </a:p>
@@ -1824,7 +1825,7 @@
           <a:p>
             <a:fld id="{627A7FD4-D23E-4EE1-9D5D-C5330F442824}" type="datetimeFigureOut">
               <a:rPr lang="it-IT" smtClean="0"/>
-              <a:t>06/02/2024</a:t>
+              <a:t>07/02/2024</a:t>
             </a:fld>
             <a:endParaRPr lang="it-IT"/>
           </a:p>
@@ -1965,7 +1966,7 @@
           <a:p>
             <a:fld id="{627A7FD4-D23E-4EE1-9D5D-C5330F442824}" type="datetimeFigureOut">
               <a:rPr lang="it-IT" smtClean="0"/>
-              <a:t>06/02/2024</a:t>
+              <a:t>07/02/2024</a:t>
             </a:fld>
             <a:endParaRPr lang="it-IT"/>
           </a:p>
@@ -2078,7 +2079,7 @@
           <a:p>
             <a:fld id="{627A7FD4-D23E-4EE1-9D5D-C5330F442824}" type="datetimeFigureOut">
               <a:rPr lang="it-IT" smtClean="0"/>
-              <a:t>06/02/2024</a:t>
+              <a:t>07/02/2024</a:t>
             </a:fld>
             <a:endParaRPr lang="it-IT"/>
           </a:p>
@@ -2389,7 +2390,7 @@
           <a:p>
             <a:fld id="{627A7FD4-D23E-4EE1-9D5D-C5330F442824}" type="datetimeFigureOut">
               <a:rPr lang="it-IT" smtClean="0"/>
-              <a:t>06/02/2024</a:t>
+              <a:t>07/02/2024</a:t>
             </a:fld>
             <a:endParaRPr lang="it-IT"/>
           </a:p>
@@ -2677,7 +2678,7 @@
           <a:p>
             <a:fld id="{627A7FD4-D23E-4EE1-9D5D-C5330F442824}" type="datetimeFigureOut">
               <a:rPr lang="it-IT" smtClean="0"/>
-              <a:t>06/02/2024</a:t>
+              <a:t>07/02/2024</a:t>
             </a:fld>
             <a:endParaRPr lang="it-IT"/>
           </a:p>
@@ -2941,7 +2942,7 @@
           <a:p>
             <a:fld id="{627A7FD4-D23E-4EE1-9D5D-C5330F442824}" type="datetimeFigureOut">
               <a:rPr lang="it-IT" smtClean="0"/>
-              <a:t>06/02/2024</a:t>
+              <a:t>07/02/2024</a:t>
             </a:fld>
             <a:endParaRPr lang="it-IT"/>
           </a:p>
@@ -3650,6 +3651,161 @@
     <p:extLst>
       <p:ext uri="{BB962C8B-B14F-4D97-AF65-F5344CB8AC3E}">
         <p14:creationId xmlns:p14="http://schemas.microsoft.com/office/powerpoint/2010/main" val="308005279"/>
+      </p:ext>
+    </p:extLst>
+  </p:cSld>
+  <p:clrMapOvr>
+    <a:masterClrMapping/>
+  </p:clrMapOvr>
+</p:sld>
+</file>
+
+<file path=ppt/slides/slide11.xml><?xml version="1.0" encoding="utf-8"?>
+<p:sld xmlns:a="http://schemas.openxmlformats.org/drawingml/2006/main" xmlns:r="http://schemas.openxmlformats.org/officeDocument/2006/relationships" xmlns:p="http://schemas.openxmlformats.org/presentationml/2006/main">
+  <p:cSld>
+    <p:spTree>
+      <p:nvGrpSpPr>
+        <p:cNvPr id="1" name="">
+          <a:extLst>
+            <a:ext uri="{FF2B5EF4-FFF2-40B4-BE49-F238E27FC236}">
+              <a16:creationId xmlns:a16="http://schemas.microsoft.com/office/drawing/2014/main" id="{45A9A8C4-BF23-3F38-46D8-08AF5750C9EC}"/>
+            </a:ext>
+          </a:extLst>
+        </p:cNvPr>
+        <p:cNvGrpSpPr/>
+        <p:nvPr/>
+      </p:nvGrpSpPr>
+      <p:grpSpPr>
+        <a:xfrm>
+          <a:off x="0" y="0"/>
+          <a:ext cx="0" cy="0"/>
+          <a:chOff x="0" y="0"/>
+          <a:chExt cx="0" cy="0"/>
+        </a:xfrm>
+      </p:grpSpPr>
+      <p:sp>
+        <p:nvSpPr>
+          <p:cNvPr id="4" name="Titolo 3">
+            <a:extLst>
+              <a:ext uri="{FF2B5EF4-FFF2-40B4-BE49-F238E27FC236}">
+                <a16:creationId xmlns:a16="http://schemas.microsoft.com/office/drawing/2014/main" id="{9CC9AB10-3622-8B59-AAEE-0E9DFAF12D2C}"/>
+              </a:ext>
+            </a:extLst>
+          </p:cNvPr>
+          <p:cNvSpPr>
+            <a:spLocks noGrp="1"/>
+          </p:cNvSpPr>
+          <p:nvPr>
+            <p:ph type="title"/>
+          </p:nvPr>
+        </p:nvSpPr>
+        <p:spPr/>
+        <p:txBody>
+          <a:bodyPr/>
+          <a:lstStyle/>
+          <a:p>
+            <a:r>
+              <a:rPr lang="it-IT" dirty="0" err="1"/>
+              <a:t>References</a:t>
+            </a:r>
+            <a:endParaRPr lang="it-IT" dirty="0"/>
+          </a:p>
+        </p:txBody>
+      </p:sp>
+      <p:sp>
+        <p:nvSpPr>
+          <p:cNvPr id="5" name="Segnaposto contenuto 4">
+            <a:extLst>
+              <a:ext uri="{FF2B5EF4-FFF2-40B4-BE49-F238E27FC236}">
+                <a16:creationId xmlns:a16="http://schemas.microsoft.com/office/drawing/2014/main" id="{17E7D849-3336-D5B9-98C3-02AF5F22F8C6}"/>
+              </a:ext>
+            </a:extLst>
+          </p:cNvPr>
+          <p:cNvSpPr>
+            <a:spLocks noGrp="1"/>
+          </p:cNvSpPr>
+          <p:nvPr>
+            <p:ph idx="1"/>
+          </p:nvPr>
+        </p:nvSpPr>
+        <p:spPr/>
+        <p:txBody>
+          <a:bodyPr/>
+          <a:lstStyle/>
+          <a:p>
+            <a:r>
+              <a:rPr lang="it-IT" dirty="0">
+                <a:hlinkClick r:id="rId2"/>
+              </a:rPr>
+              <a:t>https://www.rabbitmq.com/tutorials/amqp-concepts.html</a:t>
+            </a:r>
+            <a:endParaRPr lang="it-IT" dirty="0"/>
+          </a:p>
+          <a:p>
+            <a:r>
+              <a:rPr lang="it-IT" dirty="0">
+                <a:hlinkClick r:id="rId3"/>
+              </a:rPr>
+              <a:t>https://github.com/bianchiart/rtes-rabbitmq-project</a:t>
+            </a:r>
+            <a:r>
+              <a:rPr lang="it-IT" dirty="0"/>
+              <a:t> </a:t>
+            </a:r>
+          </a:p>
+        </p:txBody>
+      </p:sp>
+      <p:pic>
+        <p:nvPicPr>
+          <p:cNvPr id="1026" name="Picture 2" descr="RabbitMQ - meshIQ">
+            <a:extLst>
+              <a:ext uri="{FF2B5EF4-FFF2-40B4-BE49-F238E27FC236}">
+                <a16:creationId xmlns:a16="http://schemas.microsoft.com/office/drawing/2014/main" id="{3276CBFC-89C1-0EF1-E464-CAE8D9BFE482}"/>
+              </a:ext>
+            </a:extLst>
+          </p:cNvPr>
+          <p:cNvPicPr>
+            <a:picLocks noChangeAspect="1" noChangeArrowheads="1"/>
+          </p:cNvPicPr>
+          <p:nvPr/>
+        </p:nvPicPr>
+        <p:blipFill>
+          <a:blip r:embed="rId4">
+            <a:extLst>
+              <a:ext uri="{28A0092B-C50C-407E-A947-70E740481C1C}">
+                <a14:useLocalDpi xmlns:a14="http://schemas.microsoft.com/office/drawing/2010/main" val="0"/>
+              </a:ext>
+            </a:extLst>
+          </a:blip>
+          <a:srcRect/>
+          <a:stretch>
+            <a:fillRect/>
+          </a:stretch>
+        </p:blipFill>
+        <p:spPr bwMode="auto">
+          <a:xfrm>
+            <a:off x="8668031" y="4959868"/>
+            <a:ext cx="3154163" cy="1775794"/>
+          </a:xfrm>
+          <a:prstGeom prst="rect">
+            <a:avLst/>
+          </a:prstGeom>
+          <a:noFill/>
+          <a:extLst>
+            <a:ext uri="{909E8E84-426E-40DD-AFC4-6F175D3DCCD1}">
+              <a14:hiddenFill xmlns:a14="http://schemas.microsoft.com/office/drawing/2010/main">
+                <a:solidFill>
+                  <a:srgbClr val="FFFFFF"/>
+                </a:solidFill>
+              </a14:hiddenFill>
+            </a:ext>
+          </a:extLst>
+        </p:spPr>
+      </p:pic>
+    </p:spTree>
+    <p:extLst>
+      <p:ext uri="{BB962C8B-B14F-4D97-AF65-F5344CB8AC3E}">
+        <p14:creationId xmlns:p14="http://schemas.microsoft.com/office/powerpoint/2010/main" val="3279036293"/>
       </p:ext>
     </p:extLst>
   </p:cSld>

</xml_diff>